<commit_message>
working on code quality presentation
</commit_message>
<xml_diff>
--- a/code-quality/code-quality.pptx
+++ b/code-quality/code-quality.pptx
@@ -9,7 +9,7 @@
   </p:notesMasterIdLst>
   <p:sldIdLst>
     <p:sldId id="256" r:id="rId2"/>
-    <p:sldId id="257" r:id="rId3"/>
+    <p:sldId id="266" r:id="rId3"/>
     <p:sldId id="258" r:id="rId4"/>
     <p:sldId id="259" r:id="rId5"/>
     <p:sldId id="262" r:id="rId6"/>
@@ -515,7 +515,7 @@
           <a:p>
             <a:r>
               <a:rPr lang="en-US" dirty="0" smtClean="0"/>
-              <a:t>So, I was hanging out in production</a:t>
+              <a:t>Quality Logo</a:t>
             </a:r>
             <a:endParaRPr lang="en-US" dirty="0"/>
           </a:p>
@@ -538,7 +538,7 @@
           <a:p>
             <a:fld id="{B790C9D6-8F49-45C8-9172-D266D4EEB92C}" type="slidenum">
               <a:rPr lang="en-US" smtClean="0"/>
-              <a:t>2</a:t>
+              <a:t>1</a:t>
             </a:fld>
             <a:endParaRPr lang="en-US"/>
           </a:p>
@@ -547,7 +547,95 @@
     </p:spTree>
     <p:extLst>
       <p:ext uri="{BB962C8B-B14F-4D97-AF65-F5344CB8AC3E}">
-        <p14:creationId xmlns:p14="http://schemas.microsoft.com/office/powerpoint/2010/main" val="714881191"/>
+        <p14:creationId xmlns:p14="http://schemas.microsoft.com/office/powerpoint/2010/main" val="836385960"/>
+      </p:ext>
+    </p:extLst>
+  </p:cSld>
+  <p:clrMapOvr>
+    <a:masterClrMapping/>
+  </p:clrMapOvr>
+</p:notes>
+</file>
+
+<file path=ppt/notesSlides/notesSlide10.xml><?xml version="1.0" encoding="utf-8"?>
+<p:notes xmlns:a="http://schemas.openxmlformats.org/drawingml/2006/main" xmlns:r="http://schemas.openxmlformats.org/officeDocument/2006/relationships" xmlns:p="http://schemas.openxmlformats.org/presentationml/2006/main">
+  <p:cSld>
+    <p:spTree>
+      <p:nvGrpSpPr>
+        <p:cNvPr id="1" name=""/>
+        <p:cNvGrpSpPr/>
+        <p:nvPr/>
+      </p:nvGrpSpPr>
+      <p:grpSpPr>
+        <a:xfrm>
+          <a:off x="0" y="0"/>
+          <a:ext cx="0" cy="0"/>
+          <a:chOff x="0" y="0"/>
+          <a:chExt cx="0" cy="0"/>
+        </a:xfrm>
+      </p:grpSpPr>
+      <p:sp>
+        <p:nvSpPr>
+          <p:cNvPr id="2" name="Slide Image Placeholder 1"/>
+          <p:cNvSpPr>
+            <a:spLocks noGrp="1" noRot="1" noChangeAspect="1"/>
+          </p:cNvSpPr>
+          <p:nvPr>
+            <p:ph type="sldImg"/>
+          </p:nvPr>
+        </p:nvSpPr>
+        <p:spPr/>
+      </p:sp>
+      <p:sp>
+        <p:nvSpPr>
+          <p:cNvPr id="3" name="Notes Placeholder 2"/>
+          <p:cNvSpPr>
+            <a:spLocks noGrp="1"/>
+          </p:cNvSpPr>
+          <p:nvPr>
+            <p:ph type="body" idx="1"/>
+          </p:nvPr>
+        </p:nvSpPr>
+        <p:spPr/>
+        <p:txBody>
+          <a:bodyPr/>
+          <a:lstStyle/>
+          <a:p>
+            <a:r>
+              <a:rPr lang="en-US" dirty="0" smtClean="0"/>
+              <a:t>Let’s try to get to the bottom of this</a:t>
+            </a:r>
+            <a:endParaRPr lang="en-US" dirty="0"/>
+          </a:p>
+        </p:txBody>
+      </p:sp>
+      <p:sp>
+        <p:nvSpPr>
+          <p:cNvPr id="4" name="Slide Number Placeholder 3"/>
+          <p:cNvSpPr>
+            <a:spLocks noGrp="1"/>
+          </p:cNvSpPr>
+          <p:nvPr>
+            <p:ph type="sldNum" sz="quarter" idx="10"/>
+          </p:nvPr>
+        </p:nvSpPr>
+        <p:spPr/>
+        <p:txBody>
+          <a:bodyPr/>
+          <a:lstStyle/>
+          <a:p>
+            <a:fld id="{B790C9D6-8F49-45C8-9172-D266D4EEB92C}" type="slidenum">
+              <a:rPr lang="en-US" smtClean="0"/>
+              <a:t>10</a:t>
+            </a:fld>
+            <a:endParaRPr lang="en-US"/>
+          </a:p>
+        </p:txBody>
+      </p:sp>
+    </p:spTree>
+    <p:extLst>
+      <p:ext uri="{BB962C8B-B14F-4D97-AF65-F5344CB8AC3E}">
+        <p14:creationId xmlns:p14="http://schemas.microsoft.com/office/powerpoint/2010/main" val="2499129534"/>
       </p:ext>
     </p:extLst>
   </p:cSld>
@@ -603,11 +691,7 @@
           <a:p>
             <a:r>
               <a:rPr lang="en-US" dirty="0" smtClean="0"/>
-              <a:t>Fixing</a:t>
-            </a:r>
-            <a:r>
-              <a:rPr lang="en-US" baseline="0" dirty="0" smtClean="0"/>
-              <a:t> code and stuff</a:t>
+              <a:t>So, I was hanging out at work one day</a:t>
             </a:r>
             <a:endParaRPr lang="en-US" dirty="0"/>
           </a:p>
@@ -630,7 +714,7 @@
           <a:p>
             <a:fld id="{B790C9D6-8F49-45C8-9172-D266D4EEB92C}" type="slidenum">
               <a:rPr lang="en-US" smtClean="0"/>
-              <a:t>3</a:t>
+              <a:t>2</a:t>
             </a:fld>
             <a:endParaRPr lang="en-US"/>
           </a:p>
@@ -639,7 +723,7 @@
     </p:spTree>
     <p:extLst>
       <p:ext uri="{BB962C8B-B14F-4D97-AF65-F5344CB8AC3E}">
-        <p14:creationId xmlns:p14="http://schemas.microsoft.com/office/powerpoint/2010/main" val="1816334899"/>
+        <p14:creationId xmlns:p14="http://schemas.microsoft.com/office/powerpoint/2010/main" val="1580189960"/>
       </p:ext>
     </p:extLst>
   </p:cSld>
@@ -695,11 +779,11 @@
           <a:p>
             <a:r>
               <a:rPr lang="en-US" dirty="0" smtClean="0"/>
-              <a:t>When I came across this file,</a:t>
+              <a:t>Fixing</a:t>
             </a:r>
             <a:r>
               <a:rPr lang="en-US" baseline="0" dirty="0" smtClean="0"/>
-              <a:t> yes, that’s really the file.</a:t>
+              <a:t> code and stuff</a:t>
             </a:r>
             <a:endParaRPr lang="en-US" dirty="0"/>
           </a:p>
@@ -722,7 +806,7 @@
           <a:p>
             <a:fld id="{B790C9D6-8F49-45C8-9172-D266D4EEB92C}" type="slidenum">
               <a:rPr lang="en-US" smtClean="0"/>
-              <a:t>4</a:t>
+              <a:t>3</a:t>
             </a:fld>
             <a:endParaRPr lang="en-US"/>
           </a:p>
@@ -731,7 +815,7 @@
     </p:spTree>
     <p:extLst>
       <p:ext uri="{BB962C8B-B14F-4D97-AF65-F5344CB8AC3E}">
-        <p14:creationId xmlns:p14="http://schemas.microsoft.com/office/powerpoint/2010/main" val="1861241782"/>
+        <p14:creationId xmlns:p14="http://schemas.microsoft.com/office/powerpoint/2010/main" val="1816334899"/>
       </p:ext>
     </p:extLst>
   </p:cSld>
@@ -787,7 +871,11 @@
           <a:p>
             <a:r>
               <a:rPr lang="en-US" dirty="0" smtClean="0"/>
-              <a:t>And it had stuff like this in it.</a:t>
+              <a:t>When I came across this file,</a:t>
+            </a:r>
+            <a:r>
+              <a:rPr lang="en-US" baseline="0" dirty="0" smtClean="0"/>
+              <a:t> yes, that’s really the file.</a:t>
             </a:r>
             <a:endParaRPr lang="en-US" dirty="0"/>
           </a:p>
@@ -810,7 +898,7 @@
           <a:p>
             <a:fld id="{B790C9D6-8F49-45C8-9172-D266D4EEB92C}" type="slidenum">
               <a:rPr lang="en-US" smtClean="0"/>
-              <a:t>5</a:t>
+              <a:t>4</a:t>
             </a:fld>
             <a:endParaRPr lang="en-US"/>
           </a:p>
@@ -875,7 +963,7 @@
           <a:p>
             <a:r>
               <a:rPr lang="en-US" dirty="0" smtClean="0"/>
-              <a:t>And this</a:t>
+              <a:t>And it had stuff like this in it.</a:t>
             </a:r>
             <a:endParaRPr lang="en-US" dirty="0"/>
           </a:p>
@@ -898,7 +986,7 @@
           <a:p>
             <a:fld id="{B790C9D6-8F49-45C8-9172-D266D4EEB92C}" type="slidenum">
               <a:rPr lang="en-US" smtClean="0"/>
-              <a:t>6</a:t>
+              <a:t>5</a:t>
             </a:fld>
             <a:endParaRPr lang="en-US"/>
           </a:p>
@@ -963,11 +1051,15 @@
           <a:p>
             <a:r>
               <a:rPr lang="en-US" dirty="0" smtClean="0"/>
-              <a:t>Which</a:t>
+              <a:t>And </a:t>
+            </a:r>
+            <a:r>
+              <a:rPr lang="en-US" dirty="0" smtClean="0"/>
+              <a:t>this… wait… that’s not so</a:t>
             </a:r>
             <a:r>
               <a:rPr lang="en-US" baseline="0" dirty="0" smtClean="0"/>
-              <a:t> is actually this</a:t>
+              <a:t> bad</a:t>
             </a:r>
             <a:endParaRPr lang="en-US" dirty="0"/>
           </a:p>
@@ -990,7 +1082,7 @@
           <a:p>
             <a:fld id="{B790C9D6-8F49-45C8-9172-D266D4EEB92C}" type="slidenum">
               <a:rPr lang="en-US" smtClean="0"/>
-              <a:t>7</a:t>
+              <a:t>6</a:t>
             </a:fld>
             <a:endParaRPr lang="en-US"/>
           </a:p>
@@ -1054,8 +1146,12 @@
           <a:lstStyle/>
           <a:p>
             <a:r>
+              <a:rPr lang="en-US" dirty="0" err="1" smtClean="0"/>
+              <a:t>Nevermind</a:t>
+            </a:r>
+            <a:r>
               <a:rPr lang="en-US" dirty="0" smtClean="0"/>
-              <a:t>Let’s look at some stats and try to get to the bottom of this?</a:t>
+              <a:t>….</a:t>
             </a:r>
             <a:endParaRPr lang="en-US" dirty="0"/>
           </a:p>
@@ -1078,7 +1174,7 @@
           <a:p>
             <a:fld id="{B790C9D6-8F49-45C8-9172-D266D4EEB92C}" type="slidenum">
               <a:rPr lang="en-US" smtClean="0"/>
-              <a:t>10</a:t>
+              <a:t>7</a:t>
             </a:fld>
             <a:endParaRPr lang="en-US"/>
           </a:p>
@@ -1087,7 +1183,187 @@
     </p:spTree>
     <p:extLst>
       <p:ext uri="{BB962C8B-B14F-4D97-AF65-F5344CB8AC3E}">
-        <p14:creationId xmlns:p14="http://schemas.microsoft.com/office/powerpoint/2010/main" val="2499129534"/>
+        <p14:creationId xmlns:p14="http://schemas.microsoft.com/office/powerpoint/2010/main" val="1861241782"/>
+      </p:ext>
+    </p:extLst>
+  </p:cSld>
+  <p:clrMapOvr>
+    <a:masterClrMapping/>
+  </p:clrMapOvr>
+</p:notes>
+</file>
+
+<file path=ppt/notesSlides/notesSlide8.xml><?xml version="1.0" encoding="utf-8"?>
+<p:notes xmlns:a="http://schemas.openxmlformats.org/drawingml/2006/main" xmlns:r="http://schemas.openxmlformats.org/officeDocument/2006/relationships" xmlns:p="http://schemas.openxmlformats.org/presentationml/2006/main">
+  <p:cSld>
+    <p:spTree>
+      <p:nvGrpSpPr>
+        <p:cNvPr id="1" name=""/>
+        <p:cNvGrpSpPr/>
+        <p:nvPr/>
+      </p:nvGrpSpPr>
+      <p:grpSpPr>
+        <a:xfrm>
+          <a:off x="0" y="0"/>
+          <a:ext cx="0" cy="0"/>
+          <a:chOff x="0" y="0"/>
+          <a:chExt cx="0" cy="0"/>
+        </a:xfrm>
+      </p:grpSpPr>
+      <p:sp>
+        <p:nvSpPr>
+          <p:cNvPr id="2" name="Slide Image Placeholder 1"/>
+          <p:cNvSpPr>
+            <a:spLocks noGrp="1" noRot="1" noChangeAspect="1"/>
+          </p:cNvSpPr>
+          <p:nvPr>
+            <p:ph type="sldImg"/>
+          </p:nvPr>
+        </p:nvSpPr>
+        <p:spPr/>
+      </p:sp>
+      <p:sp>
+        <p:nvSpPr>
+          <p:cNvPr id="3" name="Notes Placeholder 2"/>
+          <p:cNvSpPr>
+            <a:spLocks noGrp="1"/>
+          </p:cNvSpPr>
+          <p:nvPr>
+            <p:ph type="body" idx="1"/>
+          </p:nvPr>
+        </p:nvSpPr>
+        <p:spPr/>
+        <p:txBody>
+          <a:bodyPr/>
+          <a:lstStyle/>
+          <a:p>
+            <a:r>
+              <a:rPr lang="en-US" dirty="0" err="1" smtClean="0"/>
+              <a:t>Wat</a:t>
+            </a:r>
+            <a:r>
+              <a:rPr lang="en-US" dirty="0" smtClean="0"/>
+              <a:t>!?</a:t>
+            </a:r>
+            <a:endParaRPr lang="en-US" dirty="0"/>
+          </a:p>
+        </p:txBody>
+      </p:sp>
+      <p:sp>
+        <p:nvSpPr>
+          <p:cNvPr id="4" name="Slide Number Placeholder 3"/>
+          <p:cNvSpPr>
+            <a:spLocks noGrp="1"/>
+          </p:cNvSpPr>
+          <p:nvPr>
+            <p:ph type="sldNum" sz="quarter" idx="10"/>
+          </p:nvPr>
+        </p:nvSpPr>
+        <p:spPr/>
+        <p:txBody>
+          <a:bodyPr/>
+          <a:lstStyle/>
+          <a:p>
+            <a:fld id="{B790C9D6-8F49-45C8-9172-D266D4EEB92C}" type="slidenum">
+              <a:rPr lang="en-US" smtClean="0"/>
+              <a:t>8</a:t>
+            </a:fld>
+            <a:endParaRPr lang="en-US"/>
+          </a:p>
+        </p:txBody>
+      </p:sp>
+    </p:spTree>
+    <p:extLst>
+      <p:ext uri="{BB962C8B-B14F-4D97-AF65-F5344CB8AC3E}">
+        <p14:creationId xmlns:p14="http://schemas.microsoft.com/office/powerpoint/2010/main" val="86650877"/>
+      </p:ext>
+    </p:extLst>
+  </p:cSld>
+  <p:clrMapOvr>
+    <a:masterClrMapping/>
+  </p:clrMapOvr>
+</p:notes>
+</file>
+
+<file path=ppt/notesSlides/notesSlide9.xml><?xml version="1.0" encoding="utf-8"?>
+<p:notes xmlns:a="http://schemas.openxmlformats.org/drawingml/2006/main" xmlns:r="http://schemas.openxmlformats.org/officeDocument/2006/relationships" xmlns:p="http://schemas.openxmlformats.org/presentationml/2006/main">
+  <p:cSld>
+    <p:spTree>
+      <p:nvGrpSpPr>
+        <p:cNvPr id="1" name=""/>
+        <p:cNvGrpSpPr/>
+        <p:nvPr/>
+      </p:nvGrpSpPr>
+      <p:grpSpPr>
+        <a:xfrm>
+          <a:off x="0" y="0"/>
+          <a:ext cx="0" cy="0"/>
+          <a:chOff x="0" y="0"/>
+          <a:chExt cx="0" cy="0"/>
+        </a:xfrm>
+      </p:grpSpPr>
+      <p:sp>
+        <p:nvSpPr>
+          <p:cNvPr id="2" name="Slide Image Placeholder 1"/>
+          <p:cNvSpPr>
+            <a:spLocks noGrp="1" noRot="1" noChangeAspect="1"/>
+          </p:cNvSpPr>
+          <p:nvPr>
+            <p:ph type="sldImg"/>
+          </p:nvPr>
+        </p:nvSpPr>
+        <p:spPr/>
+      </p:sp>
+      <p:sp>
+        <p:nvSpPr>
+          <p:cNvPr id="3" name="Notes Placeholder 2"/>
+          <p:cNvSpPr>
+            <a:spLocks noGrp="1"/>
+          </p:cNvSpPr>
+          <p:nvPr>
+            <p:ph type="body" idx="1"/>
+          </p:nvPr>
+        </p:nvSpPr>
+        <p:spPr/>
+        <p:txBody>
+          <a:bodyPr/>
+          <a:lstStyle/>
+          <a:p>
+            <a:r>
+              <a:rPr lang="en-US" dirty="0" smtClean="0"/>
+              <a:t>How did this happen?</a:t>
+            </a:r>
+            <a:endParaRPr lang="en-US" dirty="0"/>
+          </a:p>
+        </p:txBody>
+      </p:sp>
+      <p:sp>
+        <p:nvSpPr>
+          <p:cNvPr id="4" name="Slide Number Placeholder 3"/>
+          <p:cNvSpPr>
+            <a:spLocks noGrp="1"/>
+          </p:cNvSpPr>
+          <p:nvPr>
+            <p:ph type="sldNum" sz="quarter" idx="10"/>
+          </p:nvPr>
+        </p:nvSpPr>
+        <p:spPr/>
+        <p:txBody>
+          <a:bodyPr/>
+          <a:lstStyle/>
+          <a:p>
+            <a:fld id="{B790C9D6-8F49-45C8-9172-D266D4EEB92C}" type="slidenum">
+              <a:rPr lang="en-US" smtClean="0"/>
+              <a:t>9</a:t>
+            </a:fld>
+            <a:endParaRPr lang="en-US"/>
+          </a:p>
+        </p:txBody>
+      </p:sp>
+    </p:spTree>
+    <p:extLst>
+      <p:ext uri="{BB962C8B-B14F-4D97-AF65-F5344CB8AC3E}">
+        <p14:creationId xmlns:p14="http://schemas.microsoft.com/office/powerpoint/2010/main" val="2125320514"/>
       </p:ext>
     </p:extLst>
   </p:cSld>
@@ -4049,29 +4325,6 @@
           <a:chExt cx="0" cy="0"/>
         </a:xfrm>
       </p:grpSpPr>
-      <p:sp>
-        <p:nvSpPr>
-          <p:cNvPr id="2" name="Title 1"/>
-          <p:cNvSpPr>
-            <a:spLocks noGrp="1"/>
-          </p:cNvSpPr>
-          <p:nvPr>
-            <p:ph type="ctrTitle"/>
-          </p:nvPr>
-        </p:nvSpPr>
-        <p:spPr/>
-        <p:txBody>
-          <a:bodyPr/>
-          <a:lstStyle/>
-          <a:p>
-            <a:r>
-              <a:rPr lang="en-US" dirty="0" smtClean="0"/>
-              <a:t>We’re here to make you think about code and get sad and stuff</a:t>
-            </a:r>
-            <a:endParaRPr lang="en-US" dirty="0"/>
-          </a:p>
-        </p:txBody>
-      </p:sp>
     </p:spTree>
     <p:extLst>
       <p:ext uri="{BB962C8B-B14F-4D97-AF65-F5344CB8AC3E}">
@@ -4187,32 +4440,9 @@
           <a:chExt cx="0" cy="0"/>
         </a:xfrm>
       </p:grpSpPr>
-      <p:sp>
-        <p:nvSpPr>
-          <p:cNvPr id="2" name="Title 1"/>
-          <p:cNvSpPr>
-            <a:spLocks noGrp="1"/>
-          </p:cNvSpPr>
-          <p:nvPr>
-            <p:ph type="title"/>
-          </p:nvPr>
-        </p:nvSpPr>
-        <p:spPr/>
-        <p:txBody>
-          <a:bodyPr/>
-          <a:lstStyle/>
-          <a:p>
-            <a:r>
-              <a:rPr lang="en-US" dirty="0" smtClean="0"/>
-              <a:t>So, I was hanging out in production</a:t>
-            </a:r>
-            <a:endParaRPr lang="en-US" dirty="0"/>
-          </a:p>
-        </p:txBody>
-      </p:sp>
       <p:pic>
         <p:nvPicPr>
-          <p:cNvPr id="3074" name="Picture 2" descr="http://www.ece.gatech.edu/academic/courses/ece4007/09spring/ece4007l04/dk2/images/ProjectProgress/MattDebuggingCodeWithDaniel.JPG"/>
+          <p:cNvPr id="1028" name="Picture 4" descr="http://www.stephenjburke.com/wp-content/uploads/2009/10/Sleeping-at-Work.jpg"/>
           <p:cNvPicPr>
             <a:picLocks noChangeAspect="1" noChangeArrowheads="1"/>
           </p:cNvPicPr>
@@ -4233,8 +4463,8 @@
         </p:blipFill>
         <p:spPr bwMode="auto">
           <a:xfrm>
-            <a:off x="76200" y="76200"/>
-            <a:ext cx="8839200" cy="6629400"/>
+            <a:off x="1600200" y="1143000"/>
+            <a:ext cx="6096000" cy="4572000"/>
           </a:xfrm>
           <a:prstGeom prst="rect">
             <a:avLst/>
@@ -4254,20 +4484,13 @@
     </p:spTree>
     <p:extLst>
       <p:ext uri="{BB962C8B-B14F-4D97-AF65-F5344CB8AC3E}">
-        <p14:creationId xmlns:p14="http://schemas.microsoft.com/office/powerpoint/2010/main" val="1838915568"/>
+        <p14:creationId xmlns:p14="http://schemas.microsoft.com/office/powerpoint/2010/main" val="2988527162"/>
       </p:ext>
     </p:extLst>
   </p:cSld>
   <p:clrMapOvr>
     <a:masterClrMapping/>
   </p:clrMapOvr>
-  <p:timing>
-    <p:tnLst>
-      <p:par>
-        <p:cTn id="1" dur="indefinite" restart="never" nodeType="tmRoot"/>
-      </p:par>
-    </p:tnLst>
-  </p:timing>
 </p:sld>
 </file>
 
@@ -4756,7 +4979,7 @@
           <p:nvPr/>
         </p:nvPicPr>
         <p:blipFill>
-          <a:blip r:embed="rId2">
+          <a:blip r:embed="rId3">
             <a:extLst>
               <a:ext uri="{28A0092B-C50C-407E-A947-70E740481C1C}">
                 <a14:useLocalDpi xmlns:a14="http://schemas.microsoft.com/office/drawing/2010/main" val="0"/>
@@ -4834,7 +5057,7 @@
           <p:nvPr/>
         </p:nvPicPr>
         <p:blipFill>
-          <a:blip r:embed="rId2">
+          <a:blip r:embed="rId3">
             <a:extLst>
               <a:ext uri="{28A0092B-C50C-407E-A947-70E740481C1C}">
                 <a14:useLocalDpi xmlns:a14="http://schemas.microsoft.com/office/drawing/2010/main" val="0"/>

</xml_diff>